<commit_message>
Überschriften angepasst, Folien umsortiert -> Vorbereitungen für light-foliensatz
</commit_message>
<xml_diff>
--- a/slides/Tag-1_6-Git-Workflow-im-Team.pptx
+++ b/slides/Tag-1_6-Git-Workflow-im-Team.pptx
@@ -15,8 +15,8 @@
   <p:sldIdLst>
     <p:sldId id="288" r:id="rId4"/>
     <p:sldId id="387" r:id="rId5"/>
-    <p:sldId id="287" r:id="rId6"/>
-    <p:sldId id="596" r:id="rId7"/>
+    <p:sldId id="596" r:id="rId6"/>
+    <p:sldId id="287" r:id="rId7"/>
     <p:sldId id="326" r:id="rId8"/>
     <p:sldId id="420" r:id="rId9"/>
     <p:sldId id="421" r:id="rId10"/>
@@ -1107,7 +1107,7 @@
                 <a:latin typeface="Arial" panose="020B0604020202020204" pitchFamily="34" charset="0"/>
               </a:rPr>
               <a:pPr/>
-              <a:t>3</a:t>
+              <a:t>4</a:t>
             </a:fld>
             <a:endParaRPr lang="de-DE" altLang="de-DE" sz="1000">
               <a:latin typeface="Arial" panose="020B0604020202020204" pitchFamily="34" charset="0"/>
@@ -1954,7 +1954,7 @@
               <a:pPr algn="ctr">
                 <a:defRPr/>
               </a:pPr>
-              <a:t>06.06.2024</a:t>
+              <a:t>07.06.2024</a:t>
             </a:fld>
             <a:endParaRPr lang="de-DE" sz="1000" dirty="0">
               <a:solidFill>
@@ -4061,7 +4061,7 @@
               <a:pPr algn="ctr">
                 <a:defRPr/>
               </a:pPr>
-              <a:t>06.06.2024</a:t>
+              <a:t>07.06.2024</a:t>
             </a:fld>
             <a:endParaRPr lang="de-DE" sz="1000">
               <a:solidFill>
@@ -5691,6 +5691,23 @@
           <a:bodyPr/>
           <a:lstStyle/>
           <a:p>
+            <a:pPr marL="0" indent="0">
+              <a:buNone/>
+            </a:pPr>
+            <a:r>
+              <a:rPr lang="de-DE" altLang="de-DE" b="1" dirty="0"/>
+              <a:t>Zentraler </a:t>
+            </a:r>
+            <a:r>
+              <a:rPr lang="de-DE" altLang="de-DE" b="1" dirty="0" err="1"/>
+              <a:t>Git</a:t>
+            </a:r>
+            <a:r>
+              <a:rPr lang="de-DE" altLang="de-DE" b="1" dirty="0"/>
+              <a:t>-Workflow</a:t>
+            </a:r>
+          </a:p>
+          <a:p>
             <a:r>
               <a:rPr lang="de-DE" altLang="de-DE" dirty="0"/>
               <a:t>Durch die gemeinsame Arbeit auf einem Branch steigt das Konfliktpotenzial</a:t>
@@ -5794,15 +5811,11 @@
           <a:lstStyle/>
           <a:p>
             <a:r>
-              <a:rPr lang="de-DE" altLang="de-DE" dirty="0"/>
-              <a:t>Zentraler </a:t>
-            </a:r>
-            <a:r>
-              <a:rPr lang="de-DE" altLang="de-DE" dirty="0" err="1"/>
+              <a:rPr lang="de-DE" altLang="de-DE" sz="3200" dirty="0" err="1"/>
               <a:t>Git</a:t>
             </a:r>
             <a:r>
-              <a:rPr lang="de-DE" altLang="de-DE" dirty="0"/>
+              <a:rPr lang="de-DE" altLang="de-DE" sz="3200" dirty="0"/>
               <a:t>-Workflow</a:t>
             </a:r>
           </a:p>
@@ -35804,162 +35817,55 @@
       </p:grpSpPr>
       <p:sp>
         <p:nvSpPr>
-          <p:cNvPr id="5123" name="Rectangle 6">
-            <a:extLst>
-              <a:ext uri="{FF2B5EF4-FFF2-40B4-BE49-F238E27FC236}">
-                <a16:creationId xmlns:a16="http://schemas.microsoft.com/office/drawing/2014/main" id="{BC4BC2CC-AA18-345B-63ED-7D24CA6BD3B5}"/>
-              </a:ext>
-            </a:extLst>
-          </p:cNvPr>
+          <p:cNvPr id="2" name="Titel 1"/>
           <p:cNvSpPr>
-            <a:spLocks noGrp="1" noChangeArrowheads="1"/>
+            <a:spLocks noGrp="1"/>
           </p:cNvSpPr>
           <p:nvPr>
             <p:ph type="title"/>
           </p:nvPr>
         </p:nvSpPr>
-        <p:spPr>
-          <a:xfrm>
-            <a:off x="457200" y="115888"/>
-            <a:ext cx="3409950" cy="706437"/>
-          </a:xfrm>
-        </p:spPr>
+        <p:spPr/>
         <p:txBody>
           <a:bodyPr/>
           <a:lstStyle/>
           <a:p>
             <a:r>
-              <a:rPr lang="de-DE" altLang="de-DE"/>
-              <a:t>Inhalt</a:t>
+              <a:rPr lang="de-DE" cap="none" dirty="0"/>
+              <a:t>Workflows</a:t>
             </a:r>
           </a:p>
         </p:txBody>
       </p:sp>
       <p:sp>
         <p:nvSpPr>
-          <p:cNvPr id="3" name="Inhaltsplatzhalter 18">
-            <a:extLst>
-              <a:ext uri="{FF2B5EF4-FFF2-40B4-BE49-F238E27FC236}">
-                <a16:creationId xmlns:a16="http://schemas.microsoft.com/office/drawing/2014/main" id="{722A59E8-4DC4-18C6-04BE-E59EF5F3246C}"/>
-              </a:ext>
-            </a:extLst>
-          </p:cNvPr>
+          <p:cNvPr id="3" name="Untertitel 2"/>
           <p:cNvSpPr>
             <a:spLocks noGrp="1"/>
           </p:cNvSpPr>
           <p:nvPr>
-            <p:ph idx="1"/>
+            <p:ph type="body" idx="1"/>
           </p:nvPr>
         </p:nvSpPr>
-        <p:spPr>
-          <a:xfrm>
-            <a:off x="303214" y="981075"/>
-            <a:ext cx="8517258" cy="5400675"/>
-          </a:xfrm>
-        </p:spPr>
+        <p:spPr/>
         <p:txBody>
           <a:bodyPr/>
           <a:lstStyle/>
           <a:p>
-            <a:pPr>
-              <a:spcBef>
-                <a:spcPts val="300"/>
-              </a:spcBef>
-            </a:pPr>
-            <a:r>
-              <a:rPr lang="de-DE" altLang="de-DE" dirty="0"/>
-              <a:t>Was sind </a:t>
-            </a:r>
-            <a:r>
-              <a:rPr lang="de-DE" altLang="de-DE" dirty="0" err="1"/>
+            <a:r>
+              <a:rPr lang="de-DE" dirty="0" err="1"/>
               <a:t>Git</a:t>
             </a:r>
-            <a:r>
-              <a:rPr lang="de-DE" altLang="de-DE" dirty="0"/>
-              <a:t>-Workflows? </a:t>
-            </a:r>
-          </a:p>
-          <a:p>
-            <a:pPr>
-              <a:spcBef>
-                <a:spcPts val="300"/>
-              </a:spcBef>
-            </a:pPr>
-            <a:r>
-              <a:rPr lang="de-DE" altLang="de-DE" dirty="0"/>
-              <a:t>Zentraler </a:t>
-            </a:r>
-            <a:r>
-              <a:rPr lang="de-DE" altLang="de-DE" dirty="0" err="1"/>
-              <a:t>Git</a:t>
-            </a:r>
-            <a:r>
-              <a:rPr lang="de-DE" altLang="de-DE" dirty="0"/>
-              <a:t>-Workflow</a:t>
-            </a:r>
-          </a:p>
-          <a:p>
-            <a:pPr lvl="1">
-              <a:spcBef>
-                <a:spcPts val="300"/>
-              </a:spcBef>
-            </a:pPr>
-            <a:r>
-              <a:rPr lang="de-DE" altLang="de-DE" dirty="0"/>
-              <a:t>Konzept</a:t>
-            </a:r>
-          </a:p>
-          <a:p>
-            <a:pPr lvl="1">
-              <a:spcBef>
-                <a:spcPts val="300"/>
-              </a:spcBef>
-            </a:pPr>
-            <a:r>
-              <a:rPr lang="de-DE" altLang="de-DE" dirty="0"/>
-              <a:t>Ablauf</a:t>
-            </a:r>
-          </a:p>
-          <a:p>
-            <a:pPr>
-              <a:spcBef>
-                <a:spcPts val="300"/>
-              </a:spcBef>
-            </a:pPr>
-            <a:r>
-              <a:rPr lang="de-DE" altLang="de-DE" dirty="0"/>
-              <a:t>Andere </a:t>
-            </a:r>
-            <a:r>
-              <a:rPr lang="de-DE" altLang="de-DE" dirty="0" err="1"/>
-              <a:t>Git</a:t>
-            </a:r>
-            <a:r>
-              <a:rPr lang="de-DE" altLang="de-DE" dirty="0"/>
-              <a:t>-Workflows</a:t>
-            </a:r>
-          </a:p>
-          <a:p>
-            <a:pPr>
-              <a:spcBef>
-                <a:spcPts val="300"/>
-              </a:spcBef>
-            </a:pPr>
-            <a:endParaRPr lang="de-DE" altLang="de-DE" dirty="0"/>
-          </a:p>
-          <a:p>
-            <a:pPr lvl="1"/>
-            <a:endParaRPr lang="de-DE" altLang="de-DE" dirty="0"/>
-          </a:p>
-          <a:p>
-            <a:pPr marL="0" indent="0">
-              <a:buNone/>
-            </a:pPr>
-            <a:endParaRPr lang="de-DE" altLang="de-DE" dirty="0"/>
+            <a:endParaRPr lang="de-DE" dirty="0"/>
           </a:p>
         </p:txBody>
       </p:sp>
     </p:spTree>
+    <p:extLst>
+      <p:ext uri="{BB962C8B-B14F-4D97-AF65-F5344CB8AC3E}">
+        <p14:creationId xmlns:p14="http://schemas.microsoft.com/office/powerpoint/2010/main" val="3092047359"/>
+      </p:ext>
+    </p:extLst>
   </p:cSld>
   <p:clrMapOvr>
     <a:masterClrMapping/>
@@ -35986,55 +35892,179 @@
       </p:grpSpPr>
       <p:sp>
         <p:nvSpPr>
-          <p:cNvPr id="2" name="Titel 1"/>
+          <p:cNvPr id="5123" name="Rectangle 6">
+            <a:extLst>
+              <a:ext uri="{FF2B5EF4-FFF2-40B4-BE49-F238E27FC236}">
+                <a16:creationId xmlns:a16="http://schemas.microsoft.com/office/drawing/2014/main" id="{BC4BC2CC-AA18-345B-63ED-7D24CA6BD3B5}"/>
+              </a:ext>
+            </a:extLst>
+          </p:cNvPr>
           <p:cNvSpPr>
-            <a:spLocks noGrp="1"/>
+            <a:spLocks noGrp="1" noChangeArrowheads="1"/>
           </p:cNvSpPr>
           <p:nvPr>
             <p:ph type="title"/>
           </p:nvPr>
         </p:nvSpPr>
-        <p:spPr/>
+        <p:spPr>
+          <a:xfrm>
+            <a:off x="303214" y="188640"/>
+            <a:ext cx="5194920" cy="706437"/>
+          </a:xfrm>
+        </p:spPr>
         <p:txBody>
           <a:bodyPr/>
           <a:lstStyle/>
           <a:p>
             <a:r>
-              <a:rPr lang="de-DE" cap="none" dirty="0"/>
-              <a:t>Workflows</a:t>
-            </a:r>
+              <a:rPr lang="de-DE" altLang="de-DE" sz="3200" dirty="0" err="1"/>
+              <a:t>Git</a:t>
+            </a:r>
+            <a:r>
+              <a:rPr lang="de-DE" altLang="de-DE" sz="3200" dirty="0"/>
+              <a:t>-Workflow</a:t>
+            </a:r>
+            <a:endParaRPr lang="de-DE" altLang="de-DE" dirty="0"/>
           </a:p>
         </p:txBody>
       </p:sp>
       <p:sp>
         <p:nvSpPr>
-          <p:cNvPr id="3" name="Untertitel 2"/>
+          <p:cNvPr id="3" name="Inhaltsplatzhalter 18">
+            <a:extLst>
+              <a:ext uri="{FF2B5EF4-FFF2-40B4-BE49-F238E27FC236}">
+                <a16:creationId xmlns:a16="http://schemas.microsoft.com/office/drawing/2014/main" id="{722A59E8-4DC4-18C6-04BE-E59EF5F3246C}"/>
+              </a:ext>
+            </a:extLst>
+          </p:cNvPr>
           <p:cNvSpPr>
             <a:spLocks noGrp="1"/>
           </p:cNvSpPr>
           <p:nvPr>
-            <p:ph type="body" idx="1"/>
+            <p:ph idx="1"/>
           </p:nvPr>
         </p:nvSpPr>
-        <p:spPr/>
+        <p:spPr>
+          <a:xfrm>
+            <a:off x="303214" y="981075"/>
+            <a:ext cx="8517258" cy="5400675"/>
+          </a:xfrm>
+        </p:spPr>
         <p:txBody>
           <a:bodyPr/>
           <a:lstStyle/>
           <a:p>
-            <a:r>
-              <a:rPr lang="de-DE" dirty="0" err="1"/>
+            <a:pPr marL="0" indent="0">
+              <a:spcBef>
+                <a:spcPts val="300"/>
+              </a:spcBef>
+              <a:buNone/>
+            </a:pPr>
+            <a:r>
+              <a:rPr lang="de-DE" altLang="de-DE" b="1" dirty="0"/>
+              <a:t>Agenda</a:t>
+            </a:r>
+          </a:p>
+          <a:p>
+            <a:pPr>
+              <a:spcBef>
+                <a:spcPts val="300"/>
+              </a:spcBef>
+            </a:pPr>
+            <a:r>
+              <a:rPr lang="de-DE" altLang="de-DE" dirty="0"/>
+              <a:t>Was sind </a:t>
+            </a:r>
+            <a:r>
+              <a:rPr lang="de-DE" altLang="de-DE" dirty="0" err="1"/>
               <a:t>Git</a:t>
             </a:r>
-            <a:endParaRPr lang="de-DE" dirty="0"/>
+            <a:r>
+              <a:rPr lang="de-DE" altLang="de-DE" dirty="0"/>
+              <a:t>-Workflows? </a:t>
+            </a:r>
+          </a:p>
+          <a:p>
+            <a:pPr>
+              <a:spcBef>
+                <a:spcPts val="300"/>
+              </a:spcBef>
+            </a:pPr>
+            <a:r>
+              <a:rPr lang="de-DE" altLang="de-DE" dirty="0"/>
+              <a:t>Zentraler </a:t>
+            </a:r>
+            <a:r>
+              <a:rPr lang="de-DE" altLang="de-DE" dirty="0" err="1"/>
+              <a:t>Git</a:t>
+            </a:r>
+            <a:r>
+              <a:rPr lang="de-DE" altLang="de-DE" dirty="0"/>
+              <a:t>-Workflow</a:t>
+            </a:r>
+          </a:p>
+          <a:p>
+            <a:pPr lvl="1">
+              <a:spcBef>
+                <a:spcPts val="300"/>
+              </a:spcBef>
+            </a:pPr>
+            <a:r>
+              <a:rPr lang="de-DE" altLang="de-DE" dirty="0"/>
+              <a:t>Konzept</a:t>
+            </a:r>
+          </a:p>
+          <a:p>
+            <a:pPr lvl="1">
+              <a:spcBef>
+                <a:spcPts val="300"/>
+              </a:spcBef>
+            </a:pPr>
+            <a:r>
+              <a:rPr lang="de-DE" altLang="de-DE" dirty="0"/>
+              <a:t>Ablauf</a:t>
+            </a:r>
+          </a:p>
+          <a:p>
+            <a:pPr>
+              <a:spcBef>
+                <a:spcPts val="300"/>
+              </a:spcBef>
+            </a:pPr>
+            <a:r>
+              <a:rPr lang="de-DE" altLang="de-DE" dirty="0"/>
+              <a:t>Andere </a:t>
+            </a:r>
+            <a:r>
+              <a:rPr lang="de-DE" altLang="de-DE" dirty="0" err="1"/>
+              <a:t>Git</a:t>
+            </a:r>
+            <a:r>
+              <a:rPr lang="de-DE" altLang="de-DE" dirty="0"/>
+              <a:t>-Workflows</a:t>
+            </a:r>
+          </a:p>
+          <a:p>
+            <a:pPr>
+              <a:spcBef>
+                <a:spcPts val="300"/>
+              </a:spcBef>
+            </a:pPr>
+            <a:endParaRPr lang="de-DE" altLang="de-DE" dirty="0"/>
+          </a:p>
+          <a:p>
+            <a:pPr lvl="1"/>
+            <a:endParaRPr lang="de-DE" altLang="de-DE" dirty="0"/>
+          </a:p>
+          <a:p>
+            <a:pPr marL="0" indent="0">
+              <a:buNone/>
+            </a:pPr>
+            <a:endParaRPr lang="de-DE" altLang="de-DE" dirty="0"/>
           </a:p>
         </p:txBody>
       </p:sp>
     </p:spTree>
-    <p:extLst>
-      <p:ext uri="{BB962C8B-B14F-4D97-AF65-F5344CB8AC3E}">
-        <p14:creationId xmlns:p14="http://schemas.microsoft.com/office/powerpoint/2010/main" val="3092047359"/>
-      </p:ext>
-    </p:extLst>
   </p:cSld>
   <p:clrMapOvr>
     <a:masterClrMapping/>
@@ -36085,9 +36115,26 @@
           <a:bodyPr/>
           <a:lstStyle/>
           <a:p>
+            <a:pPr marL="0" indent="0">
+              <a:buNone/>
+            </a:pPr>
+            <a:r>
+              <a:rPr lang="de-DE" altLang="de-DE" b="1" dirty="0"/>
+              <a:t>Was sind </a:t>
+            </a:r>
+            <a:r>
+              <a:rPr lang="de-DE" altLang="de-DE" b="1" dirty="0" err="1"/>
+              <a:t>Git</a:t>
+            </a:r>
+            <a:r>
+              <a:rPr lang="de-DE" altLang="de-DE" b="1" dirty="0"/>
+              <a:t>-Workflows?</a:t>
+            </a:r>
+          </a:p>
+          <a:p>
             <a:r>
               <a:rPr lang="de-DE" altLang="de-DE" dirty="0"/>
-              <a:t>Workflows sind Empfehlungen und Strategien zum Arbeiten mit </a:t>
+              <a:t>´Workflows sind Empfehlungen und Strategien zum Arbeiten mit </a:t>
             </a:r>
             <a:r>
               <a:rPr lang="de-DE" altLang="de-DE" dirty="0" err="1"/>
@@ -36166,7 +36213,7 @@
         </p:nvSpPr>
         <p:spPr>
           <a:xfrm>
-            <a:off x="285750" y="142875"/>
+            <a:off x="303214" y="188640"/>
             <a:ext cx="5654675" cy="706438"/>
           </a:xfrm>
         </p:spPr>
@@ -36175,16 +36222,12 @@
           <a:lstStyle/>
           <a:p>
             <a:r>
-              <a:rPr lang="de-DE" altLang="de-DE" dirty="0"/>
-              <a:t>Was sind </a:t>
-            </a:r>
-            <a:r>
-              <a:rPr lang="de-DE" altLang="de-DE" dirty="0" err="1"/>
+              <a:rPr lang="de-DE" altLang="de-DE" sz="3200" dirty="0" err="1"/>
               <a:t>Git</a:t>
             </a:r>
             <a:r>
-              <a:rPr lang="de-DE" altLang="de-DE" dirty="0"/>
-              <a:t>-Workflows?</a:t>
+              <a:rPr lang="de-DE" altLang="de-DE" sz="3200" dirty="0"/>
+              <a:t>-Workflow</a:t>
             </a:r>
           </a:p>
         </p:txBody>
@@ -36250,7 +36293,7 @@
             </a:pPr>
             <a:r>
               <a:rPr lang="de-DE" altLang="de-DE" b="1" dirty="0"/>
-              <a:t>Es gibt nicht den einen </a:t>
+              <a:t>Was sind </a:t>
             </a:r>
             <a:r>
               <a:rPr lang="de-DE" altLang="de-DE" b="1" dirty="0" err="1"/>
@@ -36258,92 +36301,106 @@
             </a:r>
             <a:r>
               <a:rPr lang="de-DE" altLang="de-DE" b="1" dirty="0"/>
+              <a:t>-Workflows?</a:t>
+            </a:r>
+          </a:p>
+          <a:p>
+            <a:r>
+              <a:rPr lang="de-DE" altLang="de-DE" sz="1800" dirty="0"/>
+              <a:t>Es gibt nicht den einen </a:t>
+            </a:r>
+            <a:r>
+              <a:rPr lang="de-DE" altLang="de-DE" sz="1800" dirty="0" err="1"/>
+              <a:t>Git</a:t>
+            </a:r>
+            <a:r>
+              <a:rPr lang="de-DE" altLang="de-DE" sz="1800" dirty="0"/>
               <a:t>-Workflow</a:t>
             </a:r>
           </a:p>
           <a:p>
             <a:r>
-              <a:rPr lang="de-DE" altLang="de-DE" dirty="0" err="1"/>
+              <a:rPr lang="de-DE" altLang="de-DE" sz="1800" dirty="0" err="1"/>
               <a:t>Git</a:t>
             </a:r>
             <a:r>
-              <a:rPr lang="de-DE" altLang="de-DE" dirty="0"/>
+              <a:rPr lang="de-DE" altLang="de-DE" sz="1800" dirty="0"/>
               <a:t> und </a:t>
             </a:r>
             <a:r>
-              <a:rPr lang="de-DE" altLang="de-DE" dirty="0" err="1"/>
+              <a:rPr lang="de-DE" altLang="de-DE" sz="1800" dirty="0" err="1"/>
               <a:t>GitLab</a:t>
             </a:r>
             <a:r>
-              <a:rPr lang="de-DE" altLang="de-DE" dirty="0"/>
+              <a:rPr lang="de-DE" altLang="de-DE" sz="1800" dirty="0"/>
               <a:t> bieten durch eine Vielzahl an Konzepten und Feature ganz unterschiedliche Möglichkeiten zum Einsatz</a:t>
             </a:r>
           </a:p>
           <a:p>
             <a:r>
-              <a:rPr lang="de-DE" altLang="de-DE" dirty="0"/>
+              <a:rPr lang="de-DE" altLang="de-DE" sz="1800" dirty="0"/>
               <a:t>Daher existieren auch viele </a:t>
             </a:r>
             <a:r>
-              <a:rPr lang="de-DE" altLang="de-DE" dirty="0" err="1"/>
+              <a:rPr lang="de-DE" altLang="de-DE" sz="1800" dirty="0" err="1"/>
               <a:t>Git</a:t>
             </a:r>
             <a:r>
-              <a:rPr lang="de-DE" altLang="de-DE" dirty="0"/>
+              <a:rPr lang="de-DE" altLang="de-DE" sz="1800" dirty="0"/>
               <a:t>-Workflows mit unterschiedlichen Konzepten</a:t>
             </a:r>
           </a:p>
           <a:p>
             <a:r>
-              <a:rPr lang="de-DE" altLang="de-DE" dirty="0"/>
+              <a:rPr lang="de-DE" altLang="de-DE" sz="1800" dirty="0"/>
               <a:t>Auswahl des passenden Workflows richtet sich nach bestimmten Kriterien</a:t>
             </a:r>
           </a:p>
           <a:p>
             <a:pPr lvl="1"/>
             <a:r>
-              <a:rPr lang="de-DE" altLang="de-DE" dirty="0"/>
+              <a:rPr lang="de-DE" altLang="de-DE" sz="1400" dirty="0"/>
               <a:t>Art des Projekts, indem </a:t>
             </a:r>
             <a:r>
-              <a:rPr lang="de-DE" altLang="de-DE" dirty="0" err="1"/>
+              <a:rPr lang="de-DE" altLang="de-DE" sz="1400" dirty="0" err="1"/>
               <a:t>Git</a:t>
             </a:r>
             <a:r>
-              <a:rPr lang="de-DE" altLang="de-DE" dirty="0"/>
+              <a:rPr lang="de-DE" altLang="de-DE" sz="1400" dirty="0"/>
               <a:t> verwendet wird</a:t>
             </a:r>
           </a:p>
           <a:p>
             <a:pPr lvl="1"/>
             <a:r>
-              <a:rPr lang="de-DE" altLang="de-DE" dirty="0"/>
+              <a:rPr lang="de-DE" altLang="de-DE" sz="1400" dirty="0"/>
               <a:t>Projektgröße und Umfang</a:t>
             </a:r>
           </a:p>
           <a:p>
             <a:pPr lvl="1"/>
             <a:r>
-              <a:rPr lang="de-DE" altLang="de-DE" dirty="0"/>
+              <a:rPr lang="de-DE" altLang="de-DE" sz="1400" dirty="0"/>
               <a:t>Teamgröße</a:t>
             </a:r>
           </a:p>
           <a:p>
             <a:pPr lvl="1"/>
             <a:r>
-              <a:rPr lang="de-DE" altLang="de-DE" dirty="0"/>
+              <a:rPr lang="de-DE" altLang="de-DE" sz="1400" dirty="0"/>
               <a:t>Teamkultur</a:t>
             </a:r>
           </a:p>
           <a:p>
             <a:r>
-              <a:rPr lang="de-DE" altLang="de-DE" dirty="0"/>
+              <a:rPr lang="de-DE" altLang="de-DE" sz="1800" dirty="0"/>
               <a:t>Teammitglieder müssen mit dem gewählten Workflow vertraut sein und diesen produktiv in ihre Arbeit integrieren</a:t>
             </a:r>
           </a:p>
           <a:p>
             <a:r>
-              <a:rPr lang="de-DE" altLang="de-DE" dirty="0"/>
+              <a:rPr lang="de-DE" altLang="de-DE" sz="1800" dirty="0"/>
               <a:t>Workflow darf keinen unnötigen Overhead erzeugen</a:t>
             </a:r>
           </a:p>
@@ -36388,17 +36445,14 @@
           <a:lstStyle/>
           <a:p>
             <a:r>
-              <a:rPr lang="de-DE" altLang="de-DE" dirty="0"/>
-              <a:t>Was sind </a:t>
-            </a:r>
-            <a:r>
-              <a:rPr lang="de-DE" altLang="de-DE" dirty="0" err="1"/>
+              <a:rPr lang="de-DE" altLang="de-DE" sz="3200" dirty="0" err="1"/>
               <a:t>Git</a:t>
             </a:r>
             <a:r>
-              <a:rPr lang="de-DE" altLang="de-DE" dirty="0"/>
-              <a:t>-Workflows?</a:t>
-            </a:r>
+              <a:rPr lang="de-DE" altLang="de-DE" sz="3200" dirty="0"/>
+              <a:t>-Workflow</a:t>
+            </a:r>
+            <a:endParaRPr lang="de-DE" altLang="de-DE" dirty="0"/>
           </a:p>
         </p:txBody>
       </p:sp>
@@ -36458,6 +36512,23 @@
           <a:bodyPr/>
           <a:lstStyle/>
           <a:p>
+            <a:pPr marL="0" indent="0">
+              <a:buNone/>
+            </a:pPr>
+            <a:r>
+              <a:rPr lang="de-DE" altLang="de-DE" b="1" dirty="0"/>
+              <a:t>Zentraler </a:t>
+            </a:r>
+            <a:r>
+              <a:rPr lang="de-DE" altLang="de-DE" b="1" dirty="0" err="1"/>
+              <a:t>Git</a:t>
+            </a:r>
+            <a:r>
+              <a:rPr lang="de-DE" altLang="de-DE" b="1" dirty="0"/>
+              <a:t>-Workflow</a:t>
+            </a:r>
+          </a:p>
+          <a:p>
             <a:r>
               <a:rPr lang="de-DE" altLang="de-DE" dirty="0"/>
               <a:t>Ein zentraler </a:t>
@@ -36613,15 +36684,11 @@
           <a:lstStyle/>
           <a:p>
             <a:r>
-              <a:rPr lang="de-DE" altLang="de-DE" dirty="0"/>
-              <a:t>Zentraler </a:t>
-            </a:r>
-            <a:r>
-              <a:rPr lang="de-DE" altLang="de-DE" dirty="0" err="1"/>
+              <a:rPr lang="de-DE" altLang="de-DE" sz="3200" dirty="0" err="1"/>
               <a:t>Git</a:t>
             </a:r>
             <a:r>
-              <a:rPr lang="de-DE" altLang="de-DE" dirty="0"/>
+              <a:rPr lang="de-DE" altLang="de-DE" sz="3200" dirty="0"/>
               <a:t>-Workflow</a:t>
             </a:r>
           </a:p>
@@ -36688,13 +36755,27 @@
             </a:pPr>
             <a:r>
               <a:rPr lang="de-DE" altLang="de-DE" b="1" dirty="0"/>
+              <a:t>Zentraler </a:t>
+            </a:r>
+            <a:r>
+              <a:rPr lang="de-DE" altLang="de-DE" b="1" dirty="0" err="1"/>
+              <a:t>Git</a:t>
+            </a:r>
+            <a:r>
+              <a:rPr lang="de-DE" altLang="de-DE" b="1" dirty="0"/>
+              <a:t>-Workflow</a:t>
+            </a:r>
+          </a:p>
+          <a:p>
+            <a:r>
+              <a:rPr lang="de-DE" altLang="de-DE" dirty="0"/>
               <a:t>Entwickler committen ihre Änderungen direkt auf </a:t>
             </a:r>
             <a:r>
-              <a:rPr lang="de-DE" altLang="de-DE" b="1" dirty="0" err="1"/>
+              <a:rPr lang="de-DE" altLang="de-DE" dirty="0" err="1"/>
               <a:t>main</a:t>
             </a:r>
-            <a:endParaRPr lang="de-DE" altLang="de-DE" b="1" dirty="0"/>
+            <a:endParaRPr lang="de-DE" altLang="de-DE" dirty="0"/>
           </a:p>
           <a:p>
             <a:r>
@@ -36839,15 +36920,11 @@
           <a:lstStyle/>
           <a:p>
             <a:r>
-              <a:rPr lang="de-DE" altLang="de-DE" dirty="0"/>
-              <a:t>Zentraler </a:t>
-            </a:r>
-            <a:r>
-              <a:rPr lang="de-DE" altLang="de-DE" dirty="0" err="1"/>
+              <a:rPr lang="de-DE" altLang="de-DE" sz="3200" dirty="0" err="1"/>
               <a:t>Git</a:t>
             </a:r>
             <a:r>
-              <a:rPr lang="de-DE" altLang="de-DE" dirty="0"/>
+              <a:rPr lang="de-DE" altLang="de-DE" sz="3200" dirty="0"/>
               <a:t>-Workflow</a:t>
             </a:r>
           </a:p>
@@ -36909,6 +36986,23 @@
           <a:bodyPr/>
           <a:lstStyle/>
           <a:p>
+            <a:pPr marL="0" indent="0">
+              <a:buNone/>
+            </a:pPr>
+            <a:r>
+              <a:rPr lang="de-DE" altLang="de-DE" b="1" dirty="0"/>
+              <a:t>Zentraler </a:t>
+            </a:r>
+            <a:r>
+              <a:rPr lang="de-DE" altLang="de-DE" b="1" dirty="0" err="1"/>
+              <a:t>Git</a:t>
+            </a:r>
+            <a:r>
+              <a:rPr lang="de-DE" altLang="de-DE" b="1" dirty="0"/>
+              <a:t>-Workflow</a:t>
+            </a:r>
+          </a:p>
+          <a:p>
             <a:r>
               <a:rPr lang="de-DE" altLang="de-DE" dirty="0"/>
               <a:t>Entwickler werden gezwungen, oft Änderungen von neuen </a:t>
@@ -36987,15 +37081,11 @@
           <a:lstStyle/>
           <a:p>
             <a:r>
-              <a:rPr lang="de-DE" altLang="de-DE" dirty="0"/>
-              <a:t>Zentraler </a:t>
-            </a:r>
-            <a:r>
-              <a:rPr lang="de-DE" altLang="de-DE" dirty="0" err="1"/>
+              <a:rPr lang="de-DE" altLang="de-DE" sz="3200" dirty="0" err="1"/>
               <a:t>Git</a:t>
             </a:r>
             <a:r>
-              <a:rPr lang="de-DE" altLang="de-DE" dirty="0"/>
+              <a:rPr lang="de-DE" altLang="de-DE" sz="3200" dirty="0"/>
               <a:t>-Workflow</a:t>
             </a:r>
           </a:p>

</xml_diff>

<commit_message>
Fix typo, add light-slides
</commit_message>
<xml_diff>
--- a/slides/Tag-1_6-Git-Workflow-im-Team.pptx
+++ b/slides/Tag-1_6-Git-Workflow-im-Team.pptx
@@ -36133,8 +36133,12 @@
           </a:p>
           <a:p>
             <a:r>
+              <a:rPr lang="de-DE" altLang="de-DE"/>
+              <a:t>Workflows </a:t>
+            </a:r>
+            <a:r>
               <a:rPr lang="de-DE" altLang="de-DE" dirty="0"/>
-              <a:t>´Workflows sind Empfehlungen und Strategien zum Arbeiten mit </a:t>
+              <a:t>sind Empfehlungen und Strategien zum Arbeiten mit </a:t>
             </a:r>
             <a:r>
               <a:rPr lang="de-DE" altLang="de-DE" dirty="0" err="1"/>

</xml_diff>